<commit_message>
Ultimo update de diapositivas y word que colgue en subir
</commit_message>
<xml_diff>
--- a/TeoriaDeModelos/Teoría.pptx
+++ b/TeoriaDeModelos/Teoría.pptx
@@ -225,7 +225,7 @@
             <a:pPr rtl="0"/>
             <a:fld id="{A4EE1597-BA8D-477C-BC8D-06622426F1B8}" type="datetime1">
               <a:rPr lang="es-ES" smtClean="0"/>
-              <a:t>23/08/2020</a:t>
+              <a:t>25/08/2020</a:t>
             </a:fld>
             <a:endParaRPr lang="es-ES"/>
           </a:p>
@@ -395,7 +395,7 @@
             <a:pPr rtl="0"/>
             <a:fld id="{FBB8FD01-5DB9-4A0E-83AF-656C7FE35756}" type="datetime1">
               <a:rPr lang="es-ES" noProof="0" smtClean="0"/>
-              <a:t>23/08/2020</a:t>
+              <a:t>25/08/2020</a:t>
             </a:fld>
             <a:endParaRPr lang="es-ES" noProof="0"/>
           </a:p>
@@ -2699,7 +2699,7 @@
             <a:pPr rtl="0"/>
             <a:fld id="{5318812A-3EB5-4C72-A471-A2411F3A2976}" type="datetime1">
               <a:rPr lang="es-ES" noProof="0" smtClean="0"/>
-              <a:t>23/08/2020</a:t>
+              <a:t>25/08/2020</a:t>
             </a:fld>
             <a:endParaRPr lang="es-ES" noProof="0"/>
           </a:p>
@@ -2916,7 +2916,7 @@
             <a:pPr rtl="0"/>
             <a:fld id="{AA4FF5BE-597F-4771-85FB-F9671A7D5D10}" type="datetime1">
               <a:rPr lang="es-ES" noProof="0" smtClean="0"/>
-              <a:t>23/08/2020</a:t>
+              <a:t>25/08/2020</a:t>
             </a:fld>
             <a:endParaRPr lang="es-ES" noProof="0"/>
           </a:p>
@@ -3175,7 +3175,7 @@
             <a:pPr rtl="0"/>
             <a:fld id="{35C0B9C8-DC25-47F0-944D-522491D99E52}" type="datetime1">
               <a:rPr lang="es-ES" noProof="0" smtClean="0"/>
-              <a:t>23/08/2020</a:t>
+              <a:t>25/08/2020</a:t>
             </a:fld>
             <a:endParaRPr lang="es-ES" noProof="0"/>
           </a:p>
@@ -3353,7 +3353,7 @@
             <a:pPr rtl="0"/>
             <a:fld id="{B8496F03-FD64-4297-B76C-A4AD3E11C919}" type="datetime1">
               <a:rPr lang="es-ES" noProof="0" smtClean="0"/>
-              <a:t>23/08/2020</a:t>
+              <a:t>25/08/2020</a:t>
             </a:fld>
             <a:endParaRPr lang="es-ES" noProof="0"/>
           </a:p>
@@ -3701,7 +3701,7 @@
             <a:pPr rtl="0"/>
             <a:fld id="{3840CA2F-7FE5-4F04-99F6-D500EDAC649B}" type="datetime1">
               <a:rPr lang="es-ES" noProof="0" smtClean="0"/>
-              <a:t>23/08/2020</a:t>
+              <a:t>25/08/2020</a:t>
             </a:fld>
             <a:endParaRPr lang="es-ES" noProof="0"/>
           </a:p>
@@ -3980,7 +3980,7 @@
             <a:pPr rtl="0"/>
             <a:fld id="{26B6D807-47AA-44ED-999B-06C2CDE0C23F}" type="datetime1">
               <a:rPr lang="es-ES" noProof="0" smtClean="0"/>
-              <a:t>23/08/2020</a:t>
+              <a:t>25/08/2020</a:t>
             </a:fld>
             <a:endParaRPr lang="es-ES" noProof="0"/>
           </a:p>
@@ -4362,7 +4362,7 @@
             <a:pPr rtl="0"/>
             <a:fld id="{DC6BC4C7-D15A-465B-9D66-1939648F1B1F}" type="datetime1">
               <a:rPr lang="es-ES" noProof="0" smtClean="0"/>
-              <a:t>23/08/2020</a:t>
+              <a:t>25/08/2020</a:t>
             </a:fld>
             <a:endParaRPr lang="es-ES" noProof="0"/>
           </a:p>
@@ -4483,7 +4483,7 @@
             <a:pPr rtl="0"/>
             <a:fld id="{5C628DDE-090C-4047-8194-2AF6FE321D4F}" type="datetime1">
               <a:rPr lang="es-ES" noProof="0" smtClean="0"/>
-              <a:t>23/08/2020</a:t>
+              <a:t>25/08/2020</a:t>
             </a:fld>
             <a:endParaRPr lang="es-ES" noProof="0"/>
           </a:p>
@@ -4657,7 +4657,7 @@
             <a:pPr rtl="0"/>
             <a:fld id="{901B5E05-83B0-4CAE-BDC1-DA37AA6A2F30}" type="datetime1">
               <a:rPr lang="es-ES" noProof="0" smtClean="0"/>
-              <a:t>23/08/2020</a:t>
+              <a:t>25/08/2020</a:t>
             </a:fld>
             <a:endParaRPr lang="es-ES" noProof="0"/>
           </a:p>
@@ -5019,7 +5019,7 @@
             <a:pPr rtl="0"/>
             <a:fld id="{1F9B0ACA-E051-4A6C-8501-4FE72EA49BB6}" type="datetime1">
               <a:rPr lang="es-ES" noProof="0" smtClean="0"/>
-              <a:t>23/08/2020</a:t>
+              <a:t>25/08/2020</a:t>
             </a:fld>
             <a:endParaRPr lang="es-ES" noProof="0"/>
           </a:p>
@@ -5410,7 +5410,7 @@
             <a:pPr rtl="0"/>
             <a:fld id="{B8496F03-FD64-4297-B76C-A4AD3E11C919}" type="datetime1">
               <a:rPr lang="es-ES" noProof="0" smtClean="0"/>
-              <a:t>23/08/2020</a:t>
+              <a:t>25/08/2020</a:t>
             </a:fld>
             <a:endParaRPr lang="es-ES" noProof="0"/>
           </a:p>
@@ -5702,7 +5702,7 @@
             <a:pPr rtl="0"/>
             <a:fld id="{B8496F03-FD64-4297-B76C-A4AD3E11C919}" type="datetime1">
               <a:rPr lang="es-ES" noProof="0" smtClean="0"/>
-              <a:t>23/08/2020</a:t>
+              <a:t>25/08/2020</a:t>
             </a:fld>
             <a:endParaRPr lang="es-ES" noProof="0"/>
           </a:p>
@@ -13039,8 +13039,8 @@
           </a:p>
         </p:txBody>
       </p:sp>
-      <mc:AlternateContent xmlns:mc="http://schemas.openxmlformats.org/markup-compatibility/2006" xmlns:a14="http://schemas.microsoft.com/office/drawing/2010/main">
-        <mc:Choice Requires="a14">
+      <mc:AlternateContent xmlns:mc="http://schemas.openxmlformats.org/markup-compatibility/2006">
+        <mc:Choice xmlns:a14="http://schemas.microsoft.com/office/drawing/2010/main" Requires="a14">
           <p:sp>
             <p:nvSpPr>
               <p:cNvPr id="3" name="Marcador de contenido 2"/>
@@ -13053,338 +13053,442 @@
             </p:nvSpPr>
             <p:spPr>
               <a:xfrm>
-                <a:off x="1097280" y="2071716"/>
-                <a:ext cx="10058400" cy="3736902"/>
+                <a:off x="1097280" y="2071715"/>
+                <a:ext cx="10058400" cy="4329085"/>
               </a:xfrm>
             </p:spPr>
             <p:txBody>
               <a:bodyPr>
-                <a:normAutofit/>
+                <a:normAutofit fontScale="70000" lnSpcReduction="20000"/>
               </a:bodyPr>
               <a:lstStyle/>
               <a:p>
-                <a:pPr algn="ctr"/>
+                <a:pPr marL="0" indent="0" algn="ctr">
+                  <a:buNone/>
+                </a:pPr>
                 <a14:m>
                   <m:oMath xmlns:m="http://schemas.openxmlformats.org/officeDocument/2006/math">
-                    <m:r>
-                      <a:rPr lang="es-AR" i="1" smtClean="0">
-                        <a:latin typeface="Cambria Math" panose="02040503050406030204" pitchFamily="18" charset="0"/>
-                      </a:rPr>
-                      <m:t>𝑉𝑎𝑟</m:t>
-                    </m:r>
-                    <m:r>
-                      <a:rPr lang="es-AR" i="1" smtClean="0">
-                        <a:latin typeface="Cambria Math" panose="02040503050406030204" pitchFamily="18" charset="0"/>
-                      </a:rPr>
-                      <m:t>(</m:t>
-                    </m:r>
-                    <m:acc>
-                      <m:accPr>
-                        <m:chr m:val="̂"/>
+                    <m:sSub>
+                      <m:sSubPr>
                         <m:ctrlPr>
-                          <a:rPr lang="en-US" i="1">
-                            <a:latin typeface="Cambria Math" panose="02040503050406030204" pitchFamily="18" charset="0"/>
-                          </a:rPr>
+                          <a:rPr lang="en-US" sz="3200"/>
                         </m:ctrlPr>
-                      </m:accPr>
-                      <m:e>
-                        <m:sSub>
-                          <m:sSubPr>
-                            <m:ctrlPr>
-                              <a:rPr lang="en-US" i="1">
-                                <a:latin typeface="Cambria Math" panose="02040503050406030204" pitchFamily="18" charset="0"/>
-                              </a:rPr>
-                            </m:ctrlPr>
-                          </m:sSubPr>
-                          <m:e>
-                            <m:r>
-                              <a:rPr lang="es-AR" i="1">
-                                <a:latin typeface="Cambria Math" panose="02040503050406030204" pitchFamily="18" charset="0"/>
-                              </a:rPr>
-                              <m:t>𝜁</m:t>
-                            </m:r>
-                          </m:e>
-                          <m:sub>
-                            <m:r>
-                              <a:rPr lang="es-AR" i="1">
-                                <a:latin typeface="Cambria Math" panose="02040503050406030204" pitchFamily="18" charset="0"/>
-                              </a:rPr>
-                              <m:t>𝑢</m:t>
-                            </m:r>
-                          </m:sub>
-                        </m:sSub>
-                      </m:e>
-                    </m:acc>
-                    <m:r>
-                      <a:rPr lang="es-AR" i="1">
-                        <a:latin typeface="Cambria Math" panose="02040503050406030204" pitchFamily="18" charset="0"/>
-                      </a:rPr>
-                      <m:t>)≈</m:t>
-                    </m:r>
-                    <m:acc>
-                      <m:accPr>
-                        <m:chr m:val="̂"/>
-                        <m:ctrlPr>
-                          <a:rPr lang="en-US" i="1">
-                            <a:latin typeface="Cambria Math" panose="02040503050406030204" pitchFamily="18" charset="0"/>
-                          </a:rPr>
-                        </m:ctrlPr>
-                      </m:accPr>
-                      <m:e>
-                        <m:sSub>
-                          <m:sSubPr>
-                            <m:ctrlPr>
-                              <a:rPr lang="en-US" i="1">
-                                <a:latin typeface="Cambria Math" panose="02040503050406030204" pitchFamily="18" charset="0"/>
-                              </a:rPr>
-                            </m:ctrlPr>
-                          </m:sSubPr>
-                          <m:e>
-                            <m:r>
-                              <a:rPr lang="es-AR" i="1">
-                                <a:latin typeface="Cambria Math" panose="02040503050406030204" pitchFamily="18" charset="0"/>
-                              </a:rPr>
-                              <m:t>𝜁</m:t>
-                            </m:r>
-                          </m:e>
-                          <m:sub>
-                            <m:r>
-                              <a:rPr lang="es-AR" i="1">
-                                <a:latin typeface="Cambria Math" panose="02040503050406030204" pitchFamily="18" charset="0"/>
-                              </a:rPr>
-                              <m:t>𝑢</m:t>
-                            </m:r>
-                          </m:sub>
-                        </m:sSub>
-                      </m:e>
-                    </m:acc>
-                    <m:r>
-                      <a:rPr lang="es-AR" i="1">
-                        <a:latin typeface="Cambria Math" panose="02040503050406030204" pitchFamily="18" charset="0"/>
-                      </a:rPr>
-                      <m:t>(1−</m:t>
-                    </m:r>
-                    <m:acc>
-                      <m:accPr>
-                        <m:chr m:val="̂"/>
-                        <m:ctrlPr>
-                          <a:rPr lang="en-US" i="1">
-                            <a:latin typeface="Cambria Math" panose="02040503050406030204" pitchFamily="18" charset="0"/>
-                          </a:rPr>
-                        </m:ctrlPr>
-                      </m:accPr>
-                      <m:e>
-                        <m:sSub>
-                          <m:sSubPr>
-                            <m:ctrlPr>
-                              <a:rPr lang="en-US" i="1">
-                                <a:latin typeface="Cambria Math" panose="02040503050406030204" pitchFamily="18" charset="0"/>
-                              </a:rPr>
-                            </m:ctrlPr>
-                          </m:sSubPr>
-                          <m:e>
-                            <m:r>
-                              <a:rPr lang="es-AR" i="1">
-                                <a:latin typeface="Cambria Math" panose="02040503050406030204" pitchFamily="18" charset="0"/>
-                              </a:rPr>
-                              <m:t>𝜁</m:t>
-                            </m:r>
-                          </m:e>
-                          <m:sub>
-                            <m:r>
-                              <a:rPr lang="es-AR" i="1">
-                                <a:latin typeface="Cambria Math" panose="02040503050406030204" pitchFamily="18" charset="0"/>
-                              </a:rPr>
-                              <m:t>𝑢</m:t>
-                            </m:r>
-                          </m:sub>
-                        </m:sSub>
-                      </m:e>
-                    </m:acc>
-                    <m:r>
-                      <a:rPr lang="es-AR" i="1">
-                        <a:latin typeface="Cambria Math" panose="02040503050406030204" pitchFamily="18" charset="0"/>
-                      </a:rPr>
-                      <m:t>)/</m:t>
-                    </m:r>
-                    <m:r>
-                      <a:rPr lang="es-AR" i="1">
-                        <a:latin typeface="Cambria Math" panose="02040503050406030204" pitchFamily="18" charset="0"/>
-                      </a:rPr>
-                      <m:t>𝑛</m:t>
-                    </m:r>
-                  </m:oMath>
-                </a14:m>
-                <a:endParaRPr lang="en-US" dirty="0"/>
-              </a:p>
-              <a:p>
-                <a:pPr algn="ctr"/>
-                <a14:m>
-                  <m:oMath xmlns:m="http://schemas.openxmlformats.org/officeDocument/2006/math">
-                    <m:r>
-                      <a:rPr lang="es-AR" i="1">
-                        <a:latin typeface="Cambria Math" panose="02040503050406030204" pitchFamily="18" charset="0"/>
-                      </a:rPr>
-                      <m:t>𝑉𝑎𝑟</m:t>
-                    </m:r>
-                    <m:d>
-                      <m:dPr>
-                        <m:ctrlPr>
-                          <a:rPr lang="en-US" i="1">
-                            <a:latin typeface="Cambria Math" panose="02040503050406030204" pitchFamily="18" charset="0"/>
-                          </a:rPr>
-                        </m:ctrlPr>
-                      </m:dPr>
-                      <m:e>
-                        <m:acc>
-                          <m:accPr>
-                            <m:chr m:val="̂"/>
-                            <m:ctrlPr>
-                              <a:rPr lang="en-US" i="1">
-                                <a:latin typeface="Cambria Math" panose="02040503050406030204" pitchFamily="18" charset="0"/>
-                              </a:rPr>
-                            </m:ctrlPr>
-                          </m:accPr>
-                          <m:e>
-                            <m:sSub>
-                              <m:sSubPr>
-                                <m:ctrlPr>
-                                  <a:rPr lang="en-US" i="1">
-                                    <a:latin typeface="Cambria Math" panose="02040503050406030204" pitchFamily="18" charset="0"/>
-                                  </a:rPr>
-                                </m:ctrlPr>
-                              </m:sSubPr>
-                              <m:e>
-                                <m:r>
-                                  <a:rPr lang="es-AR" i="1">
-                                    <a:latin typeface="Cambria Math" panose="02040503050406030204" pitchFamily="18" charset="0"/>
-                                  </a:rPr>
-                                  <m:t>𝑥</m:t>
-                                </m:r>
-                              </m:e>
-                              <m:sub>
-                                <m:r>
-                                  <a:rPr lang="es-AR" i="1">
-                                    <a:latin typeface="Cambria Math" panose="02040503050406030204" pitchFamily="18" charset="0"/>
-                                  </a:rPr>
-                                  <m:t>𝑚</m:t>
-                                </m:r>
-                              </m:sub>
-                            </m:sSub>
-                          </m:e>
-                        </m:acc>
-                      </m:e>
-                    </m:d>
-                    <m:r>
-                      <a:rPr lang="es-AR" i="1">
-                        <a:latin typeface="Cambria Math" panose="02040503050406030204" pitchFamily="18" charset="0"/>
-                      </a:rPr>
-                      <m:t>≈</m:t>
-                    </m:r>
-                    <m:r>
-                      <a:rPr lang="es-AR">
-                        <a:latin typeface="Cambria Math" panose="02040503050406030204" pitchFamily="18" charset="0"/>
-                      </a:rPr>
-                      <m:t>𝛻</m:t>
-                    </m:r>
-                    <m:sSubSup>
-                      <m:sSubSupPr>
-                        <m:ctrlPr>
-                          <a:rPr lang="en-US" i="1">
-                            <a:latin typeface="Cambria Math" panose="02040503050406030204" pitchFamily="18" charset="0"/>
-                          </a:rPr>
-                        </m:ctrlPr>
-                      </m:sSubSupPr>
+                      </m:sSubPr>
                       <m:e>
                         <m:r>
-                          <a:rPr lang="es-AR" i="1">
-                            <a:latin typeface="Cambria Math" panose="02040503050406030204" pitchFamily="18" charset="0"/>
-                          </a:rPr>
+                          <a:rPr lang="es-AR" sz="3200"/>
                           <m:t>𝑥</m:t>
                         </m:r>
                       </m:e>
                       <m:sub>
                         <m:r>
-                          <a:rPr lang="es-AR" i="1">
-                            <a:latin typeface="Cambria Math" panose="02040503050406030204" pitchFamily="18" charset="0"/>
-                          </a:rPr>
-                          <m:t>𝑚</m:t>
-                        </m:r>
-                      </m:sub>
-                      <m:sup>
-                        <m:r>
-                          <a:rPr lang="es-AR" i="1">
-                            <a:latin typeface="Cambria Math" panose="02040503050406030204" pitchFamily="18" charset="0"/>
-                          </a:rPr>
-                          <m:t>𝑇</m:t>
-                        </m:r>
-                      </m:sup>
-                    </m:sSubSup>
-                    <m:r>
-                      <a:rPr lang="es-AR" i="1">
-                        <a:latin typeface="Cambria Math" panose="02040503050406030204" pitchFamily="18" charset="0"/>
-                      </a:rPr>
-                      <m:t> </m:t>
-                    </m:r>
-                    <m:r>
-                      <a:rPr lang="es-AR" i="1">
-                        <a:latin typeface="Cambria Math" panose="02040503050406030204" pitchFamily="18" charset="0"/>
-                      </a:rPr>
-                      <m:t>𝑉</m:t>
-                    </m:r>
-                    <m:r>
-                      <a:rPr lang="es-AR" i="1">
-                        <a:latin typeface="Cambria Math" panose="02040503050406030204" pitchFamily="18" charset="0"/>
-                      </a:rPr>
-                      <m:t> </m:t>
-                    </m:r>
-                    <m:r>
-                      <a:rPr lang="es-AR">
-                        <a:latin typeface="Cambria Math" panose="02040503050406030204" pitchFamily="18" charset="0"/>
-                      </a:rPr>
-                      <m:t>𝛻</m:t>
-                    </m:r>
-                    <m:sSub>
-                      <m:sSubPr>
-                        <m:ctrlPr>
-                          <a:rPr lang="en-US" i="1">
-                            <a:latin typeface="Cambria Math" panose="02040503050406030204" pitchFamily="18" charset="0"/>
-                          </a:rPr>
-                        </m:ctrlPr>
-                      </m:sSubPr>
-                      <m:e>
-                        <m:r>
-                          <a:rPr lang="es-AR" i="1">
-                            <a:latin typeface="Cambria Math" panose="02040503050406030204" pitchFamily="18" charset="0"/>
-                          </a:rPr>
-                          <m:t>𝑥</m:t>
-                        </m:r>
-                      </m:e>
-                      <m:sub>
-                        <m:r>
-                          <a:rPr lang="es-AR" i="1">
-                            <a:latin typeface="Cambria Math" panose="02040503050406030204" pitchFamily="18" charset="0"/>
-                          </a:rPr>
-                          <m:t>𝑚</m:t>
+                          <a:rPr lang="es-AR" sz="3200"/>
+                          <m:t>𝑝</m:t>
                         </m:r>
                       </m:sub>
                     </m:sSub>
+                    <m:r>
+                      <a:rPr lang="es-AR" sz="3200"/>
+                      <m:t>=</m:t>
+                    </m:r>
+                    <m:r>
+                      <a:rPr lang="es-AR" sz="3200"/>
+                      <m:t>𝜇</m:t>
+                    </m:r>
+                    <m:r>
+                      <a:rPr lang="es-AR" sz="3200"/>
+                      <m:t>−</m:t>
+                    </m:r>
+                    <m:r>
+                      <a:rPr lang="es-AR" sz="3200"/>
+                      <m:t>𝜎</m:t>
+                    </m:r>
+                    <m:r>
+                      <a:rPr lang="es-AR" sz="3200"/>
+                      <m:t> </m:t>
+                    </m:r>
+                    <m:func>
+                      <m:funcPr>
+                        <m:ctrlPr>
+                          <a:rPr lang="en-US" sz="3200"/>
+                        </m:ctrlPr>
+                      </m:funcPr>
+                      <m:fName>
+                        <m:r>
+                          <m:rPr>
+                            <m:sty m:val="p"/>
+                          </m:rPr>
+                          <a:rPr lang="es-AR" sz="3200"/>
+                          <m:t>log</m:t>
+                        </m:r>
+                      </m:fName>
+                      <m:e>
+                        <m:d>
+                          <m:dPr>
+                            <m:ctrlPr>
+                              <a:rPr lang="en-US" sz="3200"/>
+                            </m:ctrlPr>
+                          </m:dPr>
+                          <m:e>
+                            <m:r>
+                              <a:rPr lang="es-AR" sz="3200"/>
+                              <m:t>−</m:t>
+                            </m:r>
+                            <m:func>
+                              <m:funcPr>
+                                <m:ctrlPr>
+                                  <a:rPr lang="en-US" sz="3200"/>
+                                </m:ctrlPr>
+                              </m:funcPr>
+                              <m:fName>
+                                <m:r>
+                                  <m:rPr>
+                                    <m:sty m:val="p"/>
+                                  </m:rPr>
+                                  <a:rPr lang="es-AR" sz="3200"/>
+                                  <m:t>log</m:t>
+                                </m:r>
+                              </m:fName>
+                              <m:e>
+                                <m:d>
+                                  <m:dPr>
+                                    <m:ctrlPr>
+                                      <a:rPr lang="en-US" sz="3200"/>
+                                    </m:ctrlPr>
+                                  </m:dPr>
+                                  <m:e>
+                                    <m:r>
+                                      <a:rPr lang="es-AR" sz="3200"/>
+                                      <m:t>1−</m:t>
+                                    </m:r>
+                                    <m:r>
+                                      <a:rPr lang="es-AR" sz="3200"/>
+                                      <m:t>𝑝</m:t>
+                                    </m:r>
+                                  </m:e>
+                                </m:d>
+                              </m:e>
+                            </m:func>
+                          </m:e>
+                        </m:d>
+                      </m:e>
+                    </m:func>
                   </m:oMath>
                 </a14:m>
-                <a:endParaRPr lang="en-US" dirty="0" smtClean="0"/>
+                <a:r>
+                  <a:rPr lang="en-US" sz="3200" dirty="0"/>
+                  <a:t> </a:t>
+                </a:r>
+                <a:r>
+                  <a:rPr lang="en-US" sz="3200" dirty="0" err="1"/>
+                  <a:t>si</a:t>
+                </a:r>
+                <a:r>
+                  <a:rPr lang="en-US" sz="3200" dirty="0"/>
+                  <a:t> la </a:t>
+                </a:r>
+                <a:r>
+                  <a:rPr lang="en-US" sz="3200" dirty="0" err="1"/>
+                  <a:t>familia</a:t>
+                </a:r>
+                <a:r>
+                  <a:rPr lang="en-US" sz="3200" dirty="0"/>
+                  <a:t> </a:t>
+                </a:r>
+                <a:r>
+                  <a:rPr lang="en-US" sz="3200" dirty="0" err="1"/>
+                  <a:t>es</a:t>
+                </a:r>
+                <a:r>
+                  <a:rPr lang="en-US" sz="3200" dirty="0"/>
+                  <a:t> de Gumbel</a:t>
+                </a:r>
+                <a:endParaRPr lang="en-US" sz="3200" dirty="0"/>
+              </a:p>
+              <a:p>
+                <a:pPr marL="0" indent="0" algn="ctr">
+                  <a:buNone/>
+                </a:pPr>
+                <a:endParaRPr lang="es-AR" sz="3200" dirty="0" smtClean="0"/>
+              </a:p>
+              <a:p>
+                <a:pPr marL="0" indent="0" algn="ctr">
+                  <a:buNone/>
+                </a:pPr>
+                <a14:m>
+                  <m:oMathPara xmlns:m="http://schemas.openxmlformats.org/officeDocument/2006/math">
+                    <m:oMathParaPr>
+                      <m:jc m:val="centerGroup"/>
+                    </m:oMathParaPr>
+                    <m:oMath xmlns:m="http://schemas.openxmlformats.org/officeDocument/2006/math">
+                      <m:r>
+                        <a:rPr lang="es-AR" sz="3200"/>
+                        <m:t>𝑉𝑎𝑟</m:t>
+                      </m:r>
+                      <m:d>
+                        <m:dPr>
+                          <m:ctrlPr>
+                            <a:rPr lang="en-US" sz="3200"/>
+                          </m:ctrlPr>
+                        </m:dPr>
+                        <m:e>
+                          <m:acc>
+                            <m:accPr>
+                              <m:chr m:val="̂"/>
+                              <m:ctrlPr>
+                                <a:rPr lang="en-US" sz="3200"/>
+                              </m:ctrlPr>
+                            </m:accPr>
+                            <m:e>
+                              <m:sSub>
+                                <m:sSubPr>
+                                  <m:ctrlPr>
+                                    <a:rPr lang="en-US" sz="3200"/>
+                                  </m:ctrlPr>
+                                </m:sSubPr>
+                                <m:e>
+                                  <m:r>
+                                    <a:rPr lang="es-AR" sz="3200"/>
+                                    <m:t>𝑥</m:t>
+                                  </m:r>
+                                </m:e>
+                                <m:sub>
+                                  <m:r>
+                                    <a:rPr lang="es-AR" sz="3200"/>
+                                    <m:t>𝑝</m:t>
+                                  </m:r>
+                                </m:sub>
+                              </m:sSub>
+                            </m:e>
+                          </m:acc>
+                        </m:e>
+                      </m:d>
+                      <m:r>
+                        <a:rPr lang="es-AR" sz="3200"/>
+                        <m:t>≈</m:t>
+                      </m:r>
+                      <m:r>
+                        <a:rPr lang="es-AR" sz="3200"/>
+                        <m:t>𝛻</m:t>
+                      </m:r>
+                      <m:sSubSup>
+                        <m:sSubSupPr>
+                          <m:ctrlPr>
+                            <a:rPr lang="en-US" sz="3200"/>
+                          </m:ctrlPr>
+                        </m:sSubSupPr>
+                        <m:e>
+                          <m:r>
+                            <a:rPr lang="es-AR" sz="3200"/>
+                            <m:t>𝑥</m:t>
+                          </m:r>
+                        </m:e>
+                        <m:sub>
+                          <m:r>
+                            <a:rPr lang="es-AR" sz="3200"/>
+                            <m:t>𝑝</m:t>
+                          </m:r>
+                        </m:sub>
+                        <m:sup>
+                          <m:r>
+                            <a:rPr lang="es-AR" sz="3200"/>
+                            <m:t>𝑇</m:t>
+                          </m:r>
+                        </m:sup>
+                      </m:sSubSup>
+                      <m:r>
+                        <a:rPr lang="es-AR" sz="3200"/>
+                        <m:t> </m:t>
+                      </m:r>
+                      <m:r>
+                        <a:rPr lang="es-AR" sz="3200"/>
+                        <m:t>𝑉</m:t>
+                      </m:r>
+                      <m:r>
+                        <a:rPr lang="es-AR" sz="3200"/>
+                        <m:t> </m:t>
+                      </m:r>
+                      <m:r>
+                        <a:rPr lang="es-AR" sz="3200"/>
+                        <m:t>𝛻</m:t>
+                      </m:r>
+                      <m:sSub>
+                        <m:sSubPr>
+                          <m:ctrlPr>
+                            <a:rPr lang="en-US" sz="3200"/>
+                          </m:ctrlPr>
+                        </m:sSubPr>
+                        <m:e>
+                          <m:r>
+                            <a:rPr lang="es-AR" sz="3200"/>
+                            <m:t>𝑥</m:t>
+                          </m:r>
+                        </m:e>
+                        <m:sub>
+                          <m:r>
+                            <a:rPr lang="es-AR" sz="3200"/>
+                            <m:t>𝑝</m:t>
+                          </m:r>
+                        </m:sub>
+                      </m:sSub>
+                    </m:oMath>
+                  </m:oMathPara>
+                </a14:m>
+                <a:endParaRPr lang="en-US" sz="3200" dirty="0"/>
+              </a:p>
+              <a:p>
+                <a:pPr marL="0" indent="0" algn="ctr">
+                  <a:buNone/>
+                </a:pPr>
+                <a:endParaRPr lang="es-AR" sz="3200" dirty="0"/>
+              </a:p>
+              <a:p>
+                <a:pPr marL="0" indent="0" algn="ctr">
+                  <a:buNone/>
+                </a:pPr>
+                <a:endParaRPr lang="es-AR" sz="3200" dirty="0"/>
+              </a:p>
+              <a:p>
+                <a:pPr marL="0" indent="0" algn="ctr">
+                  <a:buNone/>
+                </a:pPr>
+                <a14:m>
+                  <m:oMathPara xmlns:m="http://schemas.openxmlformats.org/officeDocument/2006/math">
+                    <m:oMathParaPr>
+                      <m:jc m:val="centerGroup"/>
+                    </m:oMathParaPr>
+                    <m:oMath xmlns:m="http://schemas.openxmlformats.org/officeDocument/2006/math">
+                      <m:r>
+                        <a:rPr lang="es-AR" sz="3200"/>
+                        <m:t>𝐼𝐶</m:t>
+                      </m:r>
+                      <m:r>
+                        <a:rPr lang="es-AR" sz="3200"/>
+                        <m:t>:[</m:t>
+                      </m:r>
+                      <m:r>
+                        <a:rPr lang="es-AR" sz="3200"/>
+                        <m:t>𝑣𝑎𝑙𝑜𝑟</m:t>
+                      </m:r>
+                      <m:r>
+                        <a:rPr lang="es-AR" sz="3200"/>
+                        <m:t> </m:t>
+                      </m:r>
+                      <m:r>
+                        <a:rPr lang="es-AR" sz="3200"/>
+                        <m:t>𝑝𝑢𝑛𝑡𝑢𝑎𝑙</m:t>
+                      </m:r>
+                      <m:r>
+                        <a:rPr lang="es-AR" sz="3200"/>
+                        <m:t> </m:t>
+                      </m:r>
+                      <m:r>
+                        <a:rPr lang="es-AR" sz="3200"/>
+                        <m:t>𝑒𝑠𝑡𝑖𝑚𝑎𝑑𝑜</m:t>
+                      </m:r>
+                      <m:r>
+                        <a:rPr lang="es-AR" sz="3200"/>
+                        <m:t>−∆, </m:t>
+                      </m:r>
+                      <m:r>
+                        <a:rPr lang="es-AR" sz="3200"/>
+                        <m:t>𝑣𝑎𝑙𝑜𝑟</m:t>
+                      </m:r>
+                      <m:r>
+                        <a:rPr lang="es-AR" sz="3200"/>
+                        <m:t> </m:t>
+                      </m:r>
+                      <m:r>
+                        <a:rPr lang="es-AR" sz="3200"/>
+                        <m:t>𝑝𝑢𝑛𝑡𝑢𝑎𝑙</m:t>
+                      </m:r>
+                      <m:r>
+                        <a:rPr lang="es-AR" sz="3200"/>
+                        <m:t> </m:t>
+                      </m:r>
+                      <m:r>
+                        <a:rPr lang="es-AR" sz="3200"/>
+                        <m:t>𝑒𝑠𝑡𝑖𝑚𝑎𝑑𝑜</m:t>
+                      </m:r>
+                      <m:r>
+                        <a:rPr lang="es-AR" sz="3200"/>
+                        <m:t>+ ∆]</m:t>
+                      </m:r>
+                    </m:oMath>
+                  </m:oMathPara>
+                </a14:m>
+                <a:endParaRPr lang="en-US" sz="3200" dirty="0"/>
+              </a:p>
+              <a:p>
+                <a:pPr marL="0" indent="0" algn="ctr">
+                  <a:buNone/>
+                </a:pPr>
+                <a14:m>
+                  <m:oMathPara xmlns:m="http://schemas.openxmlformats.org/officeDocument/2006/math">
+                    <m:oMathParaPr>
+                      <m:jc m:val="centerGroup"/>
+                    </m:oMathParaPr>
+                    <m:oMath xmlns:m="http://schemas.openxmlformats.org/officeDocument/2006/math">
+                      <m:r>
+                        <a:rPr lang="es-AR" sz="3200"/>
+                        <m:t>∆ = </m:t>
+                      </m:r>
+                      <m:sSub>
+                        <m:sSubPr>
+                          <m:ctrlPr>
+                            <a:rPr lang="en-US" sz="3200"/>
+                          </m:ctrlPr>
+                        </m:sSubPr>
+                        <m:e>
+                          <m:r>
+                            <a:rPr lang="es-AR" sz="3200"/>
+                            <m:t>𝑠</m:t>
+                          </m:r>
+                        </m:e>
+                        <m:sub>
+                          <m:r>
+                            <a:rPr lang="es-AR" sz="3200"/>
+                            <m:t>𝑝</m:t>
+                          </m:r>
+                        </m:sub>
+                      </m:sSub>
+                      <m:r>
+                        <a:rPr lang="es-AR" sz="3200"/>
+                        <m:t>  </m:t>
+                      </m:r>
+                      <m:r>
+                        <a:rPr lang="es-AR" sz="3200"/>
+                        <m:t>𝑠𝑡𝑑𝑣</m:t>
+                      </m:r>
+                      <m:r>
+                        <a:rPr lang="es-AR" sz="3200"/>
+                        <m:t>(</m:t>
+                      </m:r>
+                      <m:r>
+                        <a:rPr lang="es-AR" sz="3200"/>
+                        <m:t>𝑒𝑠𝑡𝑖𝑚𝑎𝑑𝑜𝑟</m:t>
+                      </m:r>
+                      <m:r>
+                        <a:rPr lang="es-AR" sz="3200"/>
+                        <m:t>)</m:t>
+                      </m:r>
+                    </m:oMath>
+                  </m:oMathPara>
+                </a14:m>
+                <a:endParaRPr lang="en-US" sz="3200" dirty="0"/>
               </a:p>
               <a:p>
                 <a:pPr algn="ctr"/>
                 <a:r>
-                  <a:rPr lang="es-AR" dirty="0" smtClean="0"/>
+                  <a:rPr lang="es-AR" sz="3200" dirty="0"/>
                   <a:t>Promesa de campaña 1: vamos a poder hacer gráficos que muestren esta varianza en nuestros </a:t>
                 </a:r>
                 <a:r>
-                  <a:rPr lang="es-AR" dirty="0" err="1" smtClean="0"/>
+                  <a:rPr lang="es-AR" sz="3200" dirty="0" err="1"/>
                   <a:t>ploteos</a:t>
                 </a:r>
                 <a:r>
-                  <a:rPr lang="es-AR" dirty="0" smtClean="0"/>
+                  <a:rPr lang="es-AR" sz="3200" dirty="0"/>
                   <a:t> de, por ejemplo, </a:t>
                 </a:r>
                 <a14:m>
@@ -13392,24 +13496,18 @@
                     <m:sSub>
                       <m:sSubPr>
                         <m:ctrlPr>
-                          <a:rPr lang="en-US" i="1">
-                            <a:latin typeface="Cambria Math" panose="02040503050406030204" pitchFamily="18" charset="0"/>
-                          </a:rPr>
+                          <a:rPr lang="en-US" sz="3200"/>
                         </m:ctrlPr>
                       </m:sSubPr>
                       <m:e>
                         <m:r>
-                          <a:rPr lang="es-AR" i="1">
-                            <a:latin typeface="Cambria Math" panose="02040503050406030204" pitchFamily="18" charset="0"/>
-                          </a:rPr>
+                          <a:rPr lang="es-AR" sz="3200"/>
                           <m:t>𝑥</m:t>
                         </m:r>
                       </m:e>
                       <m:sub>
                         <m:r>
-                          <a:rPr lang="es-AR" i="1">
-                            <a:latin typeface="Cambria Math" panose="02040503050406030204" pitchFamily="18" charset="0"/>
-                          </a:rPr>
+                          <a:rPr lang="es-AR" sz="3200"/>
                           <m:t>𝑚</m:t>
                         </m:r>
                       </m:sub>
@@ -13417,15 +13515,15 @@
                   </m:oMath>
                 </a14:m>
                 <a:r>
-                  <a:rPr lang="es-ES" dirty="0" smtClean="0"/>
+                  <a:rPr lang="es-ES" sz="3200" dirty="0"/>
                   <a:t> en </a:t>
                 </a:r>
                 <a:r>
-                  <a:rPr lang="es-ES" dirty="0"/>
+                  <a:rPr lang="es-ES" sz="3200" dirty="0"/>
                   <a:t>función </a:t>
                 </a:r>
                 <a:r>
-                  <a:rPr lang="es-ES" dirty="0" smtClean="0"/>
+                  <a:rPr lang="es-ES" sz="3200" dirty="0"/>
                   <a:t>de </a:t>
                 </a:r>
                 <a14:m>
@@ -13434,80 +13532,68 @@
                       <m:rPr>
                         <m:sty m:val="p"/>
                       </m:rPr>
-                      <a:rPr lang="es-AR" b="0" i="0" smtClean="0">
-                        <a:latin typeface="Cambria Math" panose="02040503050406030204" pitchFamily="18" charset="0"/>
-                      </a:rPr>
+                      <a:rPr lang="es-AR" sz="3200"/>
                       <m:t>log</m:t>
                     </m:r>
                     <m:r>
-                      <a:rPr lang="es-AR" b="0" i="0" smtClean="0">
-                        <a:latin typeface="Cambria Math" panose="02040503050406030204" pitchFamily="18" charset="0"/>
-                      </a:rPr>
+                      <a:rPr lang="es-AR" sz="3200"/>
                       <m:t>(</m:t>
                     </m:r>
                     <m:sSub>
                       <m:sSubPr>
                         <m:ctrlPr>
-                          <a:rPr lang="en-US" i="1">
-                            <a:latin typeface="Cambria Math" panose="02040503050406030204" pitchFamily="18" charset="0"/>
-                          </a:rPr>
+                          <a:rPr lang="en-US" sz="3200"/>
                         </m:ctrlPr>
                       </m:sSubPr>
                       <m:e>
                         <m:r>
-                          <a:rPr lang="es-AR" b="0" i="1" smtClean="0">
-                            <a:latin typeface="Cambria Math" panose="02040503050406030204" pitchFamily="18" charset="0"/>
-                          </a:rPr>
+                          <a:rPr lang="es-AR" sz="3200"/>
                           <m:t>𝑦</m:t>
                         </m:r>
                       </m:e>
                       <m:sub>
                         <m:r>
-                          <a:rPr lang="es-AR" i="1">
-                            <a:latin typeface="Cambria Math" panose="02040503050406030204" pitchFamily="18" charset="0"/>
-                          </a:rPr>
+                          <a:rPr lang="es-AR" sz="3200"/>
                           <m:t>𝑚</m:t>
                         </m:r>
                       </m:sub>
                     </m:sSub>
                     <m:r>
-                      <a:rPr lang="es-AR" b="0" i="1" smtClean="0">
-                        <a:latin typeface="Cambria Math" panose="02040503050406030204" pitchFamily="18" charset="0"/>
-                      </a:rPr>
+                      <a:rPr lang="es-AR" sz="3200"/>
                       <m:t>)</m:t>
                     </m:r>
                   </m:oMath>
                 </a14:m>
                 <a:r>
-                  <a:rPr lang="en-US" dirty="0" smtClean="0"/>
+                  <a:rPr lang="en-US" sz="3200" dirty="0"/>
                   <a:t> con </a:t>
                 </a:r>
                 <a:r>
-                  <a:rPr lang="en-US" dirty="0" err="1" smtClean="0"/>
+                  <a:rPr lang="en-US" sz="3200" dirty="0" err="1"/>
                   <a:t>su</a:t>
                 </a:r>
                 <a:r>
-                  <a:rPr lang="en-US" dirty="0" smtClean="0"/>
+                  <a:rPr lang="en-US" sz="3200" dirty="0"/>
                   <a:t> </a:t>
                 </a:r>
                 <a:r>
-                  <a:rPr lang="en-US" dirty="0" err="1" smtClean="0"/>
+                  <a:rPr lang="en-US" sz="3200" dirty="0" err="1"/>
                   <a:t>desvío</a:t>
                 </a:r>
                 <a:r>
-                  <a:rPr lang="en-US" dirty="0" smtClean="0"/>
+                  <a:rPr lang="en-US" sz="3200" dirty="0"/>
                   <a:t> </a:t>
                 </a:r>
                 <a:r>
-                  <a:rPr lang="en-US" dirty="0" err="1" smtClean="0"/>
+                  <a:rPr lang="en-US" sz="3200" dirty="0" err="1"/>
                   <a:t>correspondiente</a:t>
                 </a:r>
-                <a:endParaRPr lang="en-US" dirty="0" smtClean="0"/>
+                <a:endParaRPr lang="en-US" sz="3200" dirty="0"/>
               </a:p>
               <a:p>
                 <a:pPr algn="ctr"/>
                 <a:r>
-                  <a:rPr lang="es-AR" dirty="0" smtClean="0"/>
+                  <a:rPr lang="es-AR" sz="3200" dirty="0"/>
                   <a:t>Promesa de campaña 2: vamos a poder determinar un intervalo de confianza para un nivel de retorno dado.</a:t>
                 </a:r>
               </a:p>
@@ -13537,7 +13623,7 @@
             </p:txBody>
           </p:sp>
         </mc:Choice>
-        <mc:Fallback xmlns="">
+        <mc:Fallback>
           <p:sp>
             <p:nvSpPr>
               <p:cNvPr id="3" name="Marcador de contenido 2"/>
@@ -13550,13 +13636,13 @@
             </p:nvSpPr>
             <p:spPr>
               <a:xfrm>
-                <a:off x="1097280" y="2071716"/>
-                <a:ext cx="10058400" cy="3736902"/>
+                <a:off x="1097280" y="2071715"/>
+                <a:ext cx="10058400" cy="4329085"/>
               </a:xfrm>
               <a:blipFill>
                 <a:blip r:embed="rId3"/>
                 <a:stretch>
-                  <a:fillRect t="-1794" r="-788"/>
+                  <a:fillRect t="-2817" r="-606"/>
                 </a:stretch>
               </a:blipFill>
             </p:spPr>
@@ -13575,6 +13661,46 @@
           </p:sp>
         </mc:Fallback>
       </mc:AlternateContent>
+      <p:sp>
+        <p:nvSpPr>
+          <p:cNvPr id="4" name="Flecha abajo 3"/>
+          <p:cNvSpPr/>
+          <p:nvPr/>
+        </p:nvSpPr>
+        <p:spPr>
+          <a:xfrm>
+            <a:off x="5970494" y="3240741"/>
+            <a:ext cx="363071" cy="497541"/>
+          </a:xfrm>
+          <a:prstGeom prst="downArrow">
+            <a:avLst/>
+          </a:prstGeom>
+        </p:spPr>
+        <p:style>
+          <a:lnRef idx="2">
+            <a:schemeClr val="accent1">
+              <a:shade val="50000"/>
+            </a:schemeClr>
+          </a:lnRef>
+          <a:fillRef idx="1">
+            <a:schemeClr val="accent1"/>
+          </a:fillRef>
+          <a:effectRef idx="0">
+            <a:schemeClr val="accent1"/>
+          </a:effectRef>
+          <a:fontRef idx="minor">
+            <a:schemeClr val="lt1"/>
+          </a:fontRef>
+        </p:style>
+        <p:txBody>
+          <a:bodyPr rtlCol="0" anchor="ctr"/>
+          <a:lstStyle/>
+          <a:p>
+            <a:pPr algn="ctr"/>
+            <a:endParaRPr lang="en-US"/>
+          </a:p>
+        </p:txBody>
+      </p:sp>
     </p:spTree>
     <p:extLst>
       <p:ext uri="{BB962C8B-B14F-4D97-AF65-F5344CB8AC3E}">
@@ -13621,7 +13747,7 @@
                                         <p:tgtEl>
                                           <p:spTgt spid="3">
                                             <p:txEl>
-                                              <p:pRg st="2" end="2"/>
+                                              <p:pRg st="0" end="0"/>
                                             </p:txEl>
                                           </p:spTgt>
                                         </p:tgtEl>
@@ -13670,7 +13796,212 @@
                                         <p:tgtEl>
                                           <p:spTgt spid="3">
                                             <p:txEl>
-                                              <p:pRg st="3" end="3"/>
+                                              <p:pRg st="2" end="2"/>
+                                            </p:txEl>
+                                          </p:spTgt>
+                                        </p:tgtEl>
+                                        <p:attrNameLst>
+                                          <p:attrName>style.visibility</p:attrName>
+                                        </p:attrNameLst>
+                                      </p:cBhvr>
+                                      <p:to>
+                                        <p:strVal val="visible"/>
+                                      </p:to>
+                                    </p:set>
+                                  </p:childTnLst>
+                                </p:cTn>
+                              </p:par>
+                            </p:childTnLst>
+                          </p:cTn>
+                        </p:par>
+                      </p:childTnLst>
+                    </p:cTn>
+                  </p:par>
+                  <p:par>
+                    <p:cTn id="11" fill="hold">
+                      <p:stCondLst>
+                        <p:cond delay="indefinite"/>
+                      </p:stCondLst>
+                      <p:childTnLst>
+                        <p:par>
+                          <p:cTn id="12" fill="hold">
+                            <p:stCondLst>
+                              <p:cond delay="0"/>
+                            </p:stCondLst>
+                            <p:childTnLst>
+                              <p:par>
+                                <p:cTn id="13" presetID="1" presetClass="entr" presetSubtype="0" fill="hold" grpId="0" nodeType="clickEffect">
+                                  <p:stCondLst>
+                                    <p:cond delay="0"/>
+                                  </p:stCondLst>
+                                  <p:childTnLst>
+                                    <p:set>
+                                      <p:cBhvr>
+                                        <p:cTn id="14" dur="1" fill="hold">
+                                          <p:stCondLst>
+                                            <p:cond delay="0"/>
+                                          </p:stCondLst>
+                                        </p:cTn>
+                                        <p:tgtEl>
+                                          <p:spTgt spid="4"/>
+                                        </p:tgtEl>
+                                        <p:attrNameLst>
+                                          <p:attrName>style.visibility</p:attrName>
+                                        </p:attrNameLst>
+                                      </p:cBhvr>
+                                      <p:to>
+                                        <p:strVal val="visible"/>
+                                      </p:to>
+                                    </p:set>
+                                  </p:childTnLst>
+                                </p:cTn>
+                              </p:par>
+                            </p:childTnLst>
+                          </p:cTn>
+                        </p:par>
+                      </p:childTnLst>
+                    </p:cTn>
+                  </p:par>
+                  <p:par>
+                    <p:cTn id="15" fill="hold">
+                      <p:stCondLst>
+                        <p:cond delay="indefinite"/>
+                      </p:stCondLst>
+                      <p:childTnLst>
+                        <p:par>
+                          <p:cTn id="16" fill="hold">
+                            <p:stCondLst>
+                              <p:cond delay="0"/>
+                            </p:stCondLst>
+                            <p:childTnLst>
+                              <p:par>
+                                <p:cTn id="17" presetID="1" presetClass="entr" presetSubtype="0" fill="hold" nodeType="clickEffect">
+                                  <p:stCondLst>
+                                    <p:cond delay="0"/>
+                                  </p:stCondLst>
+                                  <p:childTnLst>
+                                    <p:set>
+                                      <p:cBhvr>
+                                        <p:cTn id="18" dur="1" fill="hold">
+                                          <p:stCondLst>
+                                            <p:cond delay="0"/>
+                                          </p:stCondLst>
+                                        </p:cTn>
+                                        <p:tgtEl>
+                                          <p:spTgt spid="3">
+                                            <p:txEl>
+                                              <p:pRg st="5" end="5"/>
+                                            </p:txEl>
+                                          </p:spTgt>
+                                        </p:tgtEl>
+                                        <p:attrNameLst>
+                                          <p:attrName>style.visibility</p:attrName>
+                                        </p:attrNameLst>
+                                      </p:cBhvr>
+                                      <p:to>
+                                        <p:strVal val="visible"/>
+                                      </p:to>
+                                    </p:set>
+                                  </p:childTnLst>
+                                </p:cTn>
+                              </p:par>
+                              <p:par>
+                                <p:cTn id="19" presetID="1" presetClass="entr" presetSubtype="0" fill="hold" nodeType="withEffect">
+                                  <p:stCondLst>
+                                    <p:cond delay="0"/>
+                                  </p:stCondLst>
+                                  <p:childTnLst>
+                                    <p:set>
+                                      <p:cBhvr>
+                                        <p:cTn id="20" dur="1" fill="hold">
+                                          <p:stCondLst>
+                                            <p:cond delay="0"/>
+                                          </p:stCondLst>
+                                        </p:cTn>
+                                        <p:tgtEl>
+                                          <p:spTgt spid="3">
+                                            <p:txEl>
+                                              <p:pRg st="6" end="6"/>
+                                            </p:txEl>
+                                          </p:spTgt>
+                                        </p:tgtEl>
+                                        <p:attrNameLst>
+                                          <p:attrName>style.visibility</p:attrName>
+                                        </p:attrNameLst>
+                                      </p:cBhvr>
+                                      <p:to>
+                                        <p:strVal val="visible"/>
+                                      </p:to>
+                                    </p:set>
+                                  </p:childTnLst>
+                                </p:cTn>
+                              </p:par>
+                            </p:childTnLst>
+                          </p:cTn>
+                        </p:par>
+                      </p:childTnLst>
+                    </p:cTn>
+                  </p:par>
+                  <p:par>
+                    <p:cTn id="21" fill="hold">
+                      <p:stCondLst>
+                        <p:cond delay="indefinite"/>
+                      </p:stCondLst>
+                      <p:childTnLst>
+                        <p:par>
+                          <p:cTn id="22" fill="hold">
+                            <p:stCondLst>
+                              <p:cond delay="0"/>
+                            </p:stCondLst>
+                            <p:childTnLst>
+                              <p:par>
+                                <p:cTn id="23" presetID="1" presetClass="entr" presetSubtype="0" fill="hold" nodeType="clickEffect">
+                                  <p:stCondLst>
+                                    <p:cond delay="0"/>
+                                  </p:stCondLst>
+                                  <p:childTnLst>
+                                    <p:set>
+                                      <p:cBhvr>
+                                        <p:cTn id="24" dur="1" fill="hold">
+                                          <p:stCondLst>
+                                            <p:cond delay="0"/>
+                                          </p:stCondLst>
+                                        </p:cTn>
+                                        <p:tgtEl>
+                                          <p:spTgt spid="3">
+                                            <p:txEl>
+                                              <p:pRg st="7" end="7"/>
+                                            </p:txEl>
+                                          </p:spTgt>
+                                        </p:tgtEl>
+                                        <p:attrNameLst>
+                                          <p:attrName>style.visibility</p:attrName>
+                                        </p:attrNameLst>
+                                      </p:cBhvr>
+                                      <p:to>
+                                        <p:strVal val="visible"/>
+                                      </p:to>
+                                    </p:set>
+                                  </p:childTnLst>
+                                </p:cTn>
+                              </p:par>
+                              <p:par>
+                                <p:cTn id="25" presetID="1" presetClass="entr" presetSubtype="0" fill="hold" nodeType="withEffect">
+                                  <p:stCondLst>
+                                    <p:cond delay="0"/>
+                                  </p:stCondLst>
+                                  <p:childTnLst>
+                                    <p:set>
+                                      <p:cBhvr>
+                                        <p:cTn id="26" dur="1" fill="hold">
+                                          <p:stCondLst>
+                                            <p:cond delay="0"/>
+                                          </p:stCondLst>
+                                        </p:cTn>
+                                        <p:tgtEl>
+                                          <p:spTgt spid="3">
+                                            <p:txEl>
+                                              <p:pRg st="8" end="8"/>
                                             </p:txEl>
                                           </p:spTgt>
                                         </p:tgtEl>
@@ -13712,6 +14043,9 @@
         </p:cTn>
       </p:par>
     </p:tnLst>
+    <p:bldLst>
+      <p:bldP spid="4" grpId="0" animBg="1"/>
+    </p:bldLst>
   </p:timing>
 </p:sld>
 </file>
@@ -18083,6 +18417,14 @@
 </file>
 
 <file path=customXml/item1.xml><?xml version="1.0" encoding="utf-8"?>
+<p:properties xmlns:p="http://schemas.microsoft.com/office/2006/metadata/properties" xmlns:xsi="http://www.w3.org/2001/XMLSchema-instance" xmlns:pc="http://schemas.microsoft.com/office/infopath/2007/PartnerControls">
+  <documentManagement>
+    <MediaServiceKeyPoints xmlns="71af3243-3dd4-4a8d-8c0d-dd76da1f02a5" xsi:nil="true"/>
+  </documentManagement>
+</p:properties>
+</file>
+
+<file path=customXml/item2.xml><?xml version="1.0" encoding="utf-8"?>
 <ct:contentTypeSchema xmlns:ct="http://schemas.microsoft.com/office/2006/metadata/contentType" xmlns:ma="http://schemas.microsoft.com/office/2006/metadata/properties/metaAttributes" ct:_="" ma:_="" ma:contentTypeName="Document" ma:contentTypeID="0x01010079F111ED35F8CC479449609E8A0923A6" ma:contentTypeVersion="11" ma:contentTypeDescription="Create a new document." ma:contentTypeScope="" ma:versionID="9677210f24a1be23c92c90fd886aa0aa">
   <xsd:schema xmlns:xsd="http://www.w3.org/2001/XMLSchema" xmlns:xs="http://www.w3.org/2001/XMLSchema" xmlns:p="http://schemas.microsoft.com/office/2006/metadata/properties" xmlns:ns2="71af3243-3dd4-4a8d-8c0d-dd76da1f02a5" xmlns:ns3="16c05727-aa75-4e4a-9b5f-8a80a1165891" targetNamespace="http://schemas.microsoft.com/office/2006/metadata/properties" ma:root="true" ma:fieldsID="60e05723c5c1908df1a1a4ebf11d344e" ns2:_="" ns3:_="">
     <xsd:import namespace="71af3243-3dd4-4a8d-8c0d-dd76da1f02a5"/>
@@ -18293,14 +18635,6 @@
 </ct:contentTypeSchema>
 </file>
 
-<file path=customXml/item2.xml><?xml version="1.0" encoding="utf-8"?>
-<p:properties xmlns:p="http://schemas.microsoft.com/office/2006/metadata/properties" xmlns:xsi="http://www.w3.org/2001/XMLSchema-instance" xmlns:pc="http://schemas.microsoft.com/office/infopath/2007/PartnerControls">
-  <documentManagement>
-    <MediaServiceKeyPoints xmlns="71af3243-3dd4-4a8d-8c0d-dd76da1f02a5" xsi:nil="true"/>
-  </documentManagement>
-</p:properties>
-</file>
-
 <file path=customXml/item3.xml><?xml version="1.0" encoding="utf-8"?>
 <?mso-contentType ?>
 <FormTemplates xmlns="http://schemas.microsoft.com/sharepoint/v3/contenttype/forms">
@@ -18311,6 +18645,23 @@
 </file>
 
 <file path=customXml/itemProps1.xml><?xml version="1.0" encoding="utf-8"?>
+<ds:datastoreItem xmlns:ds="http://schemas.openxmlformats.org/officeDocument/2006/customXml" ds:itemID="{079290C9-6505-4B77-B628-A44276CB9D85}">
+  <ds:schemaRefs>
+    <ds:schemaRef ds:uri="http://purl.org/dc/elements/1.1/"/>
+    <ds:schemaRef ds:uri="http://purl.org/dc/terms/"/>
+    <ds:schemaRef ds:uri="http://www.w3.org/XML/1998/namespace"/>
+    <ds:schemaRef ds:uri="http://schemas.microsoft.com/office/2006/metadata/properties"/>
+    <ds:schemaRef ds:uri="http://schemas.microsoft.com/office/infopath/2007/PartnerControls"/>
+    <ds:schemaRef ds:uri="71af3243-3dd4-4a8d-8c0d-dd76da1f02a5"/>
+    <ds:schemaRef ds:uri="http://purl.org/dc/dcmitype/"/>
+    <ds:schemaRef ds:uri="http://schemas.microsoft.com/office/2006/documentManagement/types"/>
+    <ds:schemaRef ds:uri="http://schemas.openxmlformats.org/package/2006/metadata/core-properties"/>
+    <ds:schemaRef ds:uri="16c05727-aa75-4e4a-9b5f-8a80a1165891"/>
+  </ds:schemaRefs>
+</ds:datastoreItem>
+</file>
+
+<file path=customXml/itemProps2.xml><?xml version="1.0" encoding="utf-8"?>
 <ds:datastoreItem xmlns:ds="http://schemas.openxmlformats.org/officeDocument/2006/customXml" ds:itemID="{47B8899B-5794-42FB-9137-8220A73767FB}">
   <ds:schemaRefs>
     <ds:schemaRef ds:uri="http://schemas.microsoft.com/office/2006/metadata/contentType"/>
@@ -18329,23 +18680,6 @@
 </ds:datastoreItem>
 </file>
 
-<file path=customXml/itemProps2.xml><?xml version="1.0" encoding="utf-8"?>
-<ds:datastoreItem xmlns:ds="http://schemas.openxmlformats.org/officeDocument/2006/customXml" ds:itemID="{079290C9-6505-4B77-B628-A44276CB9D85}">
-  <ds:schemaRefs>
-    <ds:schemaRef ds:uri="http://purl.org/dc/elements/1.1/"/>
-    <ds:schemaRef ds:uri="http://purl.org/dc/terms/"/>
-    <ds:schemaRef ds:uri="http://www.w3.org/XML/1998/namespace"/>
-    <ds:schemaRef ds:uri="http://schemas.microsoft.com/office/2006/metadata/properties"/>
-    <ds:schemaRef ds:uri="http://schemas.microsoft.com/office/infopath/2007/PartnerControls"/>
-    <ds:schemaRef ds:uri="71af3243-3dd4-4a8d-8c0d-dd76da1f02a5"/>
-    <ds:schemaRef ds:uri="http://purl.org/dc/dcmitype/"/>
-    <ds:schemaRef ds:uri="http://schemas.microsoft.com/office/2006/documentManagement/types"/>
-    <ds:schemaRef ds:uri="http://schemas.openxmlformats.org/package/2006/metadata/core-properties"/>
-    <ds:schemaRef ds:uri="16c05727-aa75-4e4a-9b5f-8a80a1165891"/>
-  </ds:schemaRefs>
-</ds:datastoreItem>
-</file>
-
 <file path=customXml/itemProps3.xml><?xml version="1.0" encoding="utf-8"?>
 <ds:datastoreItem xmlns:ds="http://schemas.openxmlformats.org/officeDocument/2006/customXml" ds:itemID="{5728C3E1-D10B-4426-B05E-8E1CAFF03C24}">
   <ds:schemaRefs>

</xml_diff>